<commit_message>
added text to the mutability slides
</commit_message>
<xml_diff>
--- a/lesson_3/Lists_and_Mutability.pptx
+++ b/lesson_3/Lists_and_Mutability.pptx
@@ -291,7 +291,7 @@
           <a:p>
             <a:fld id="{0002348E-D0FE-694B-9EEC-D1454F97A6C7}" type="datetimeFigureOut">
               <a:rPr lang="en-US" smtClean="0"/>
-              <a:t>7/12/15</a:t>
+              <a:t>7/13/15</a:t>
             </a:fld>
             <a:endParaRPr lang="en-US"/>
           </a:p>
@@ -461,7 +461,7 @@
           <a:p>
             <a:fld id="{0002348E-D0FE-694B-9EEC-D1454F97A6C7}" type="datetimeFigureOut">
               <a:rPr lang="en-US" smtClean="0"/>
-              <a:t>7/12/15</a:t>
+              <a:t>7/13/15</a:t>
             </a:fld>
             <a:endParaRPr lang="en-US"/>
           </a:p>
@@ -641,7 +641,7 @@
           <a:p>
             <a:fld id="{0002348E-D0FE-694B-9EEC-D1454F97A6C7}" type="datetimeFigureOut">
               <a:rPr lang="en-US" smtClean="0"/>
-              <a:t>7/12/15</a:t>
+              <a:t>7/13/15</a:t>
             </a:fld>
             <a:endParaRPr lang="en-US"/>
           </a:p>
@@ -811,7 +811,7 @@
           <a:p>
             <a:fld id="{0002348E-D0FE-694B-9EEC-D1454F97A6C7}" type="datetimeFigureOut">
               <a:rPr lang="en-US" smtClean="0"/>
-              <a:t>7/12/15</a:t>
+              <a:t>7/13/15</a:t>
             </a:fld>
             <a:endParaRPr lang="en-US"/>
           </a:p>
@@ -1057,7 +1057,7 @@
           <a:p>
             <a:fld id="{0002348E-D0FE-694B-9EEC-D1454F97A6C7}" type="datetimeFigureOut">
               <a:rPr lang="en-US" smtClean="0"/>
-              <a:t>7/12/15</a:t>
+              <a:t>7/13/15</a:t>
             </a:fld>
             <a:endParaRPr lang="en-US"/>
           </a:p>
@@ -1345,7 +1345,7 @@
           <a:p>
             <a:fld id="{0002348E-D0FE-694B-9EEC-D1454F97A6C7}" type="datetimeFigureOut">
               <a:rPr lang="en-US" smtClean="0"/>
-              <a:t>7/12/15</a:t>
+              <a:t>7/13/15</a:t>
             </a:fld>
             <a:endParaRPr lang="en-US"/>
           </a:p>
@@ -1767,7 +1767,7 @@
           <a:p>
             <a:fld id="{0002348E-D0FE-694B-9EEC-D1454F97A6C7}" type="datetimeFigureOut">
               <a:rPr lang="en-US" smtClean="0"/>
-              <a:t>7/12/15</a:t>
+              <a:t>7/13/15</a:t>
             </a:fld>
             <a:endParaRPr lang="en-US"/>
           </a:p>
@@ -1885,7 +1885,7 @@
           <a:p>
             <a:fld id="{0002348E-D0FE-694B-9EEC-D1454F97A6C7}" type="datetimeFigureOut">
               <a:rPr lang="en-US" smtClean="0"/>
-              <a:t>7/12/15</a:t>
+              <a:t>7/13/15</a:t>
             </a:fld>
             <a:endParaRPr lang="en-US"/>
           </a:p>
@@ -1980,7 +1980,7 @@
           <a:p>
             <a:fld id="{0002348E-D0FE-694B-9EEC-D1454F97A6C7}" type="datetimeFigureOut">
               <a:rPr lang="en-US" smtClean="0"/>
-              <a:t>7/12/15</a:t>
+              <a:t>7/13/15</a:t>
             </a:fld>
             <a:endParaRPr lang="en-US"/>
           </a:p>
@@ -2257,7 +2257,7 @@
           <a:p>
             <a:fld id="{0002348E-D0FE-694B-9EEC-D1454F97A6C7}" type="datetimeFigureOut">
               <a:rPr lang="en-US" smtClean="0"/>
-              <a:t>7/12/15</a:t>
+              <a:t>7/13/15</a:t>
             </a:fld>
             <a:endParaRPr lang="en-US"/>
           </a:p>
@@ -2510,7 +2510,7 @@
           <a:p>
             <a:fld id="{0002348E-D0FE-694B-9EEC-D1454F97A6C7}" type="datetimeFigureOut">
               <a:rPr lang="en-US" smtClean="0"/>
-              <a:t>7/12/15</a:t>
+              <a:t>7/13/15</a:t>
             </a:fld>
             <a:endParaRPr lang="en-US"/>
           </a:p>
@@ -2723,7 +2723,7 @@
           <a:p>
             <a:fld id="{0002348E-D0FE-694B-9EEC-D1454F97A6C7}" type="datetimeFigureOut">
               <a:rPr lang="en-US" smtClean="0"/>
-              <a:t>7/12/15</a:t>
+              <a:t>7/13/15</a:t>
             </a:fld>
             <a:endParaRPr lang="en-US"/>
           </a:p>
@@ -3195,6 +3195,90 @@
       </p:sp>
       <p:sp>
         <p:nvSpPr>
+          <p:cNvPr id="3" name="Content Placeholder 2"/>
+          <p:cNvSpPr>
+            <a:spLocks noGrp="1"/>
+          </p:cNvSpPr>
+          <p:nvPr>
+            <p:ph idx="1"/>
+          </p:nvPr>
+        </p:nvSpPr>
+        <p:spPr>
+          <a:xfrm>
+            <a:off x="0" y="2841918"/>
+            <a:ext cx="3840556" cy="3759484"/>
+          </a:xfrm>
+        </p:spPr>
+        <p:txBody>
+          <a:bodyPr>
+            <a:normAutofit fontScale="47500" lnSpcReduction="20000"/>
+          </a:bodyPr>
+          <a:lstStyle/>
+          <a:p>
+            <a:r>
+              <a:rPr lang="en-US" dirty="0" smtClean="0"/>
+              <a:t>It’s tempting to think of lists as containing objects, like a mailbox contains letters</a:t>
+            </a:r>
+          </a:p>
+          <a:p>
+            <a:pPr lvl="1"/>
+            <a:r>
+              <a:rPr lang="en-US" dirty="0" smtClean="0"/>
+              <a:t>But the analogy is a misleading.</a:t>
+            </a:r>
+          </a:p>
+          <a:p>
+            <a:r>
+              <a:rPr lang="en-US" dirty="0" smtClean="0"/>
+              <a:t>List items are not “inside” the list if you look at where they are stored in memory.</a:t>
+            </a:r>
+          </a:p>
+          <a:p>
+            <a:r>
+              <a:rPr lang="en-US" dirty="0" smtClean="0"/>
+              <a:t>Instead, a list has references to its items.  These are pointers to the correct memory locations.</a:t>
+            </a:r>
+          </a:p>
+          <a:p>
+            <a:pPr lvl="1"/>
+            <a:r>
+              <a:rPr lang="en-US" dirty="0" smtClean="0"/>
+              <a:t>Think of them as arrows from the list to the objects that it supposedly contains.</a:t>
+            </a:r>
+          </a:p>
+          <a:p>
+            <a:r>
+              <a:rPr lang="en-US" dirty="0" smtClean="0"/>
+              <a:t>This is very similar to the way that a variable points to a specific object.</a:t>
+            </a:r>
+          </a:p>
+          <a:p>
+            <a:r>
+              <a:rPr lang="en-US" dirty="0" smtClean="0"/>
+              <a:t>Why is this important?</a:t>
+            </a:r>
+          </a:p>
+          <a:p>
+            <a:pPr lvl="1"/>
+            <a:r>
+              <a:rPr lang="en-US" dirty="0" smtClean="0"/>
+              <a:t>It doesn’t really matter with immutable objects,</a:t>
+            </a:r>
+          </a:p>
+          <a:p>
+            <a:pPr lvl="1"/>
+            <a:r>
+              <a:rPr lang="en-US" dirty="0" smtClean="0"/>
+              <a:t>But for mutable objects, you can get confused when there are different ways to mutate them.</a:t>
+            </a:r>
+          </a:p>
+          <a:p>
+            <a:endParaRPr lang="en-US" dirty="0" smtClean="0"/>
+          </a:p>
+        </p:txBody>
+      </p:sp>
+      <p:sp>
+        <p:nvSpPr>
           <p:cNvPr id="4" name="Rectangle 3"/>
           <p:cNvSpPr/>
           <p:nvPr/>
@@ -3410,7 +3494,7 @@
         <p:spPr>
           <a:xfrm>
             <a:off x="665293" y="1363169"/>
-            <a:ext cx="2283165" cy="1623903"/>
+            <a:ext cx="2283165" cy="1294083"/>
           </a:xfrm>
           <a:prstGeom prst="rect">
             <a:avLst/>
@@ -4098,7 +4182,7 @@
           <a:p>
             <a:r>
               <a:rPr lang="en-US" dirty="0" smtClean="0"/>
-              <a:t>Mutable objects can be changed through multiple names</a:t>
+              <a:t>Mutable objects can be changed through multiple names.</a:t>
             </a:r>
             <a:endParaRPr lang="en-US" dirty="0"/>
           </a:p>
@@ -4285,11 +4369,7 @@
           <a:p>
             <a:r>
               <a:rPr lang="en-US" sz="2500" dirty="0" smtClean="0"/>
-              <a:t>Name </a:t>
-            </a:r>
-            <a:r>
-              <a:rPr lang="en-US" sz="2500" dirty="0" smtClean="0"/>
-              <a:t>Space</a:t>
+              <a:t>Name Space</a:t>
             </a:r>
           </a:p>
         </p:txBody>
@@ -5031,6 +5111,189 @@
           </a:fontRef>
         </p:style>
       </p:cxnSp>
+      <p:sp>
+        <p:nvSpPr>
+          <p:cNvPr id="29" name="Content Placeholder 2"/>
+          <p:cNvSpPr txBox="1">
+            <a:spLocks/>
+          </p:cNvSpPr>
+          <p:nvPr/>
+        </p:nvSpPr>
+        <p:spPr>
+          <a:xfrm>
+            <a:off x="0" y="4758922"/>
+            <a:ext cx="3840556" cy="1842480"/>
+          </a:xfrm>
+          <a:prstGeom prst="rect">
+            <a:avLst/>
+          </a:prstGeom>
+        </p:spPr>
+        <p:txBody>
+          <a:bodyPr vert="horz" lIns="91440" tIns="45720" rIns="91440" bIns="45720" rtlCol="0">
+            <a:normAutofit fontScale="85000" lnSpcReduction="20000"/>
+          </a:bodyPr>
+          <a:lstStyle>
+            <a:lvl1pPr marL="342900" indent="-342900" algn="l" defTabSz="457200" rtl="0" eaLnBrk="1" latinLnBrk="0" hangingPunct="1">
+              <a:spcBef>
+                <a:spcPct val="20000"/>
+              </a:spcBef>
+              <a:buFont typeface="Arial"/>
+              <a:buChar char="•"/>
+              <a:defRPr sz="3200" kern="1200">
+                <a:solidFill>
+                  <a:schemeClr val="tx1"/>
+                </a:solidFill>
+                <a:latin typeface="+mn-lt"/>
+                <a:ea typeface="+mn-ea"/>
+                <a:cs typeface="+mn-cs"/>
+              </a:defRPr>
+            </a:lvl1pPr>
+            <a:lvl2pPr marL="742950" indent="-285750" algn="l" defTabSz="457200" rtl="0" eaLnBrk="1" latinLnBrk="0" hangingPunct="1">
+              <a:spcBef>
+                <a:spcPct val="20000"/>
+              </a:spcBef>
+              <a:buFont typeface="Arial"/>
+              <a:buChar char="–"/>
+              <a:defRPr sz="2800" kern="1200">
+                <a:solidFill>
+                  <a:schemeClr val="tx1"/>
+                </a:solidFill>
+                <a:latin typeface="+mn-lt"/>
+                <a:ea typeface="+mn-ea"/>
+                <a:cs typeface="+mn-cs"/>
+              </a:defRPr>
+            </a:lvl2pPr>
+            <a:lvl3pPr marL="1143000" indent="-228600" algn="l" defTabSz="457200" rtl="0" eaLnBrk="1" latinLnBrk="0" hangingPunct="1">
+              <a:spcBef>
+                <a:spcPct val="20000"/>
+              </a:spcBef>
+              <a:buFont typeface="Arial"/>
+              <a:buChar char="•"/>
+              <a:defRPr sz="2400" kern="1200">
+                <a:solidFill>
+                  <a:schemeClr val="tx1"/>
+                </a:solidFill>
+                <a:latin typeface="+mn-lt"/>
+                <a:ea typeface="+mn-ea"/>
+                <a:cs typeface="+mn-cs"/>
+              </a:defRPr>
+            </a:lvl3pPr>
+            <a:lvl4pPr marL="1600200" indent="-228600" algn="l" defTabSz="457200" rtl="0" eaLnBrk="1" latinLnBrk="0" hangingPunct="1">
+              <a:spcBef>
+                <a:spcPct val="20000"/>
+              </a:spcBef>
+              <a:buFont typeface="Arial"/>
+              <a:buChar char="–"/>
+              <a:defRPr sz="2000" kern="1200">
+                <a:solidFill>
+                  <a:schemeClr val="tx1"/>
+                </a:solidFill>
+                <a:latin typeface="+mn-lt"/>
+                <a:ea typeface="+mn-ea"/>
+                <a:cs typeface="+mn-cs"/>
+              </a:defRPr>
+            </a:lvl4pPr>
+            <a:lvl5pPr marL="2057400" indent="-228600" algn="l" defTabSz="457200" rtl="0" eaLnBrk="1" latinLnBrk="0" hangingPunct="1">
+              <a:spcBef>
+                <a:spcPct val="20000"/>
+              </a:spcBef>
+              <a:buFont typeface="Arial"/>
+              <a:buChar char="»"/>
+              <a:defRPr sz="2000" kern="1200">
+                <a:solidFill>
+                  <a:schemeClr val="tx1"/>
+                </a:solidFill>
+                <a:latin typeface="+mn-lt"/>
+                <a:ea typeface="+mn-ea"/>
+                <a:cs typeface="+mn-cs"/>
+              </a:defRPr>
+            </a:lvl5pPr>
+            <a:lvl6pPr marL="2514600" indent="-228600" algn="l" defTabSz="457200" rtl="0" eaLnBrk="1" latinLnBrk="0" hangingPunct="1">
+              <a:spcBef>
+                <a:spcPct val="20000"/>
+              </a:spcBef>
+              <a:buFont typeface="Arial"/>
+              <a:buChar char="•"/>
+              <a:defRPr sz="2000" kern="1200">
+                <a:solidFill>
+                  <a:schemeClr val="tx1"/>
+                </a:solidFill>
+                <a:latin typeface="+mn-lt"/>
+                <a:ea typeface="+mn-ea"/>
+                <a:cs typeface="+mn-cs"/>
+              </a:defRPr>
+            </a:lvl6pPr>
+            <a:lvl7pPr marL="2971800" indent="-228600" algn="l" defTabSz="457200" rtl="0" eaLnBrk="1" latinLnBrk="0" hangingPunct="1">
+              <a:spcBef>
+                <a:spcPct val="20000"/>
+              </a:spcBef>
+              <a:buFont typeface="Arial"/>
+              <a:buChar char="•"/>
+              <a:defRPr sz="2000" kern="1200">
+                <a:solidFill>
+                  <a:schemeClr val="tx1"/>
+                </a:solidFill>
+                <a:latin typeface="+mn-lt"/>
+                <a:ea typeface="+mn-ea"/>
+                <a:cs typeface="+mn-cs"/>
+              </a:defRPr>
+            </a:lvl7pPr>
+            <a:lvl8pPr marL="3429000" indent="-228600" algn="l" defTabSz="457200" rtl="0" eaLnBrk="1" latinLnBrk="0" hangingPunct="1">
+              <a:spcBef>
+                <a:spcPct val="20000"/>
+              </a:spcBef>
+              <a:buFont typeface="Arial"/>
+              <a:buChar char="•"/>
+              <a:defRPr sz="2000" kern="1200">
+                <a:solidFill>
+                  <a:schemeClr val="tx1"/>
+                </a:solidFill>
+                <a:latin typeface="+mn-lt"/>
+                <a:ea typeface="+mn-ea"/>
+                <a:cs typeface="+mn-cs"/>
+              </a:defRPr>
+            </a:lvl8pPr>
+            <a:lvl9pPr marL="3886200" indent="-228600" algn="l" defTabSz="457200" rtl="0" eaLnBrk="1" latinLnBrk="0" hangingPunct="1">
+              <a:spcBef>
+                <a:spcPct val="20000"/>
+              </a:spcBef>
+              <a:buFont typeface="Arial"/>
+              <a:buChar char="•"/>
+              <a:defRPr sz="2000" kern="1200">
+                <a:solidFill>
+                  <a:schemeClr val="tx1"/>
+                </a:solidFill>
+                <a:latin typeface="+mn-lt"/>
+                <a:ea typeface="+mn-ea"/>
+                <a:cs typeface="+mn-cs"/>
+              </a:defRPr>
+            </a:lvl9pPr>
+          </a:lstStyle>
+          <a:p>
+            <a:r>
+              <a:rPr lang="en-US" dirty="0" smtClean="0"/>
+              <a:t>Here, I can change </a:t>
+            </a:r>
+            <a:r>
+              <a:rPr lang="en-US" dirty="0" err="1" smtClean="0"/>
+              <a:t>a_list</a:t>
+            </a:r>
+            <a:r>
+              <a:rPr lang="en-US" dirty="0" smtClean="0"/>
+              <a:t> or </a:t>
+            </a:r>
+            <a:r>
+              <a:rPr lang="en-US" dirty="0" err="1" smtClean="0"/>
+              <a:t>b_list</a:t>
+            </a:r>
+            <a:r>
+              <a:rPr lang="en-US" dirty="0" smtClean="0"/>
+              <a:t>.  But there’s only one list, so the change affects both variables.</a:t>
+            </a:r>
+            <a:endParaRPr lang="en-US" dirty="0" smtClean="0"/>
+          </a:p>
+        </p:txBody>
+      </p:sp>
     </p:spTree>
     <p:extLst>
       <p:ext uri="{BB962C8B-B14F-4D97-AF65-F5344CB8AC3E}">
@@ -5262,7 +5525,7 @@
         <p:spPr>
           <a:xfrm>
             <a:off x="665293" y="2864383"/>
-            <a:ext cx="2283165" cy="2396308"/>
+            <a:ext cx="2283165" cy="1875796"/>
           </a:xfrm>
           <a:prstGeom prst="rect">
             <a:avLst/>
@@ -5994,6 +6257,189 @@
           </a:fontRef>
         </p:style>
       </p:cxnSp>
+      <p:sp>
+        <p:nvSpPr>
+          <p:cNvPr id="28" name="Content Placeholder 2"/>
+          <p:cNvSpPr txBox="1">
+            <a:spLocks/>
+          </p:cNvSpPr>
+          <p:nvPr/>
+        </p:nvSpPr>
+        <p:spPr>
+          <a:xfrm>
+            <a:off x="0" y="4877066"/>
+            <a:ext cx="3840556" cy="1842480"/>
+          </a:xfrm>
+          <a:prstGeom prst="rect">
+            <a:avLst/>
+          </a:prstGeom>
+        </p:spPr>
+        <p:txBody>
+          <a:bodyPr vert="horz" lIns="91440" tIns="45720" rIns="91440" bIns="45720" rtlCol="0">
+            <a:normAutofit fontScale="70000" lnSpcReduction="20000"/>
+          </a:bodyPr>
+          <a:lstStyle>
+            <a:lvl1pPr marL="342900" indent="-342900" algn="l" defTabSz="457200" rtl="0" eaLnBrk="1" latinLnBrk="0" hangingPunct="1">
+              <a:spcBef>
+                <a:spcPct val="20000"/>
+              </a:spcBef>
+              <a:buFont typeface="Arial"/>
+              <a:buChar char="•"/>
+              <a:defRPr sz="3200" kern="1200">
+                <a:solidFill>
+                  <a:schemeClr val="tx1"/>
+                </a:solidFill>
+                <a:latin typeface="+mn-lt"/>
+                <a:ea typeface="+mn-ea"/>
+                <a:cs typeface="+mn-cs"/>
+              </a:defRPr>
+            </a:lvl1pPr>
+            <a:lvl2pPr marL="742950" indent="-285750" algn="l" defTabSz="457200" rtl="0" eaLnBrk="1" latinLnBrk="0" hangingPunct="1">
+              <a:spcBef>
+                <a:spcPct val="20000"/>
+              </a:spcBef>
+              <a:buFont typeface="Arial"/>
+              <a:buChar char="–"/>
+              <a:defRPr sz="2800" kern="1200">
+                <a:solidFill>
+                  <a:schemeClr val="tx1"/>
+                </a:solidFill>
+                <a:latin typeface="+mn-lt"/>
+                <a:ea typeface="+mn-ea"/>
+                <a:cs typeface="+mn-cs"/>
+              </a:defRPr>
+            </a:lvl2pPr>
+            <a:lvl3pPr marL="1143000" indent="-228600" algn="l" defTabSz="457200" rtl="0" eaLnBrk="1" latinLnBrk="0" hangingPunct="1">
+              <a:spcBef>
+                <a:spcPct val="20000"/>
+              </a:spcBef>
+              <a:buFont typeface="Arial"/>
+              <a:buChar char="•"/>
+              <a:defRPr sz="2400" kern="1200">
+                <a:solidFill>
+                  <a:schemeClr val="tx1"/>
+                </a:solidFill>
+                <a:latin typeface="+mn-lt"/>
+                <a:ea typeface="+mn-ea"/>
+                <a:cs typeface="+mn-cs"/>
+              </a:defRPr>
+            </a:lvl3pPr>
+            <a:lvl4pPr marL="1600200" indent="-228600" algn="l" defTabSz="457200" rtl="0" eaLnBrk="1" latinLnBrk="0" hangingPunct="1">
+              <a:spcBef>
+                <a:spcPct val="20000"/>
+              </a:spcBef>
+              <a:buFont typeface="Arial"/>
+              <a:buChar char="–"/>
+              <a:defRPr sz="2000" kern="1200">
+                <a:solidFill>
+                  <a:schemeClr val="tx1"/>
+                </a:solidFill>
+                <a:latin typeface="+mn-lt"/>
+                <a:ea typeface="+mn-ea"/>
+                <a:cs typeface="+mn-cs"/>
+              </a:defRPr>
+            </a:lvl4pPr>
+            <a:lvl5pPr marL="2057400" indent="-228600" algn="l" defTabSz="457200" rtl="0" eaLnBrk="1" latinLnBrk="0" hangingPunct="1">
+              <a:spcBef>
+                <a:spcPct val="20000"/>
+              </a:spcBef>
+              <a:buFont typeface="Arial"/>
+              <a:buChar char="»"/>
+              <a:defRPr sz="2000" kern="1200">
+                <a:solidFill>
+                  <a:schemeClr val="tx1"/>
+                </a:solidFill>
+                <a:latin typeface="+mn-lt"/>
+                <a:ea typeface="+mn-ea"/>
+                <a:cs typeface="+mn-cs"/>
+              </a:defRPr>
+            </a:lvl5pPr>
+            <a:lvl6pPr marL="2514600" indent="-228600" algn="l" defTabSz="457200" rtl="0" eaLnBrk="1" latinLnBrk="0" hangingPunct="1">
+              <a:spcBef>
+                <a:spcPct val="20000"/>
+              </a:spcBef>
+              <a:buFont typeface="Arial"/>
+              <a:buChar char="•"/>
+              <a:defRPr sz="2000" kern="1200">
+                <a:solidFill>
+                  <a:schemeClr val="tx1"/>
+                </a:solidFill>
+                <a:latin typeface="+mn-lt"/>
+                <a:ea typeface="+mn-ea"/>
+                <a:cs typeface="+mn-cs"/>
+              </a:defRPr>
+            </a:lvl6pPr>
+            <a:lvl7pPr marL="2971800" indent="-228600" algn="l" defTabSz="457200" rtl="0" eaLnBrk="1" latinLnBrk="0" hangingPunct="1">
+              <a:spcBef>
+                <a:spcPct val="20000"/>
+              </a:spcBef>
+              <a:buFont typeface="Arial"/>
+              <a:buChar char="•"/>
+              <a:defRPr sz="2000" kern="1200">
+                <a:solidFill>
+                  <a:schemeClr val="tx1"/>
+                </a:solidFill>
+                <a:latin typeface="+mn-lt"/>
+                <a:ea typeface="+mn-ea"/>
+                <a:cs typeface="+mn-cs"/>
+              </a:defRPr>
+            </a:lvl7pPr>
+            <a:lvl8pPr marL="3429000" indent="-228600" algn="l" defTabSz="457200" rtl="0" eaLnBrk="1" latinLnBrk="0" hangingPunct="1">
+              <a:spcBef>
+                <a:spcPct val="20000"/>
+              </a:spcBef>
+              <a:buFont typeface="Arial"/>
+              <a:buChar char="•"/>
+              <a:defRPr sz="2000" kern="1200">
+                <a:solidFill>
+                  <a:schemeClr val="tx1"/>
+                </a:solidFill>
+                <a:latin typeface="+mn-lt"/>
+                <a:ea typeface="+mn-ea"/>
+                <a:cs typeface="+mn-cs"/>
+              </a:defRPr>
+            </a:lvl8pPr>
+            <a:lvl9pPr marL="3886200" indent="-228600" algn="l" defTabSz="457200" rtl="0" eaLnBrk="1" latinLnBrk="0" hangingPunct="1">
+              <a:spcBef>
+                <a:spcPct val="20000"/>
+              </a:spcBef>
+              <a:buFont typeface="Arial"/>
+              <a:buChar char="•"/>
+              <a:defRPr sz="2000" kern="1200">
+                <a:solidFill>
+                  <a:schemeClr val="tx1"/>
+                </a:solidFill>
+                <a:latin typeface="+mn-lt"/>
+                <a:ea typeface="+mn-ea"/>
+                <a:cs typeface="+mn-cs"/>
+              </a:defRPr>
+            </a:lvl9pPr>
+          </a:lstStyle>
+          <a:p>
+            <a:r>
+              <a:rPr lang="en-US" dirty="0" smtClean="0"/>
+              <a:t>Here, there is a list that is contained in two different lists.  So if I change it somehow, both </a:t>
+            </a:r>
+            <a:r>
+              <a:rPr lang="en-US" dirty="0" err="1" smtClean="0"/>
+              <a:t>a_list</a:t>
+            </a:r>
+            <a:r>
+              <a:rPr lang="en-US" dirty="0" smtClean="0"/>
+              <a:t> and </a:t>
+            </a:r>
+            <a:r>
+              <a:rPr lang="en-US" dirty="0" err="1" smtClean="0"/>
+              <a:t>b_list</a:t>
+            </a:r>
+            <a:r>
+              <a:rPr lang="en-US" dirty="0" smtClean="0"/>
+              <a:t> appear changed.</a:t>
+            </a:r>
+            <a:endParaRPr lang="en-US" dirty="0" smtClean="0"/>
+          </a:p>
+        </p:txBody>
+      </p:sp>
     </p:spTree>
     <p:extLst>
       <p:ext uri="{BB962C8B-B14F-4D97-AF65-F5344CB8AC3E}">

</xml_diff>

<commit_message>
revised list references, deep copy
</commit_message>
<xml_diff>
--- a/lesson_3/Lists_and_Mutability.pptx
+++ b/lesson_3/Lists_and_Mutability.pptx
@@ -3249,28 +3249,42 @@
           <a:p>
             <a:r>
               <a:rPr lang="en-US" dirty="0" smtClean="0"/>
-              <a:t>This is very similar to the way that a variable points to a specific object.</a:t>
-            </a:r>
-          </a:p>
-          <a:p>
+              <a:t>This is very similar to the way that a variable points to a specific object</a:t>
+            </a:r>
             <a:r>
               <a:rPr lang="en-US" dirty="0" smtClean="0"/>
-              <a:t>Why is this important?</a:t>
-            </a:r>
-          </a:p>
-          <a:p>
-            <a:pPr lvl="1"/>
+              <a:t>.</a:t>
+            </a:r>
+          </a:p>
+          <a:p>
             <a:r>
               <a:rPr lang="en-US" dirty="0" smtClean="0"/>
-              <a:t>It doesn’t really matter with immutable objects,</a:t>
-            </a:r>
-          </a:p>
-          <a:p>
-            <a:pPr lvl="1"/>
+              <a:t>When you print a list, it gets “flattened” so that it looks like it contains its contents.</a:t>
+            </a:r>
+          </a:p>
+          <a:p>
             <a:r>
               <a:rPr lang="en-US" dirty="0" smtClean="0"/>
-              <a:t>But for mutable objects, you can get confused when there are different ways to mutate them.</a:t>
-            </a:r>
+              <a:t>If I print </a:t>
+            </a:r>
+            <a:r>
+              <a:rPr lang="en-US" dirty="0" err="1" smtClean="0"/>
+              <a:t>a_list</a:t>
+            </a:r>
+            <a:r>
+              <a:rPr lang="en-US" dirty="0" smtClean="0"/>
+              <a:t>, I would get</a:t>
+            </a:r>
+          </a:p>
+          <a:p>
+            <a:pPr marL="0" indent="0">
+              <a:buNone/>
+            </a:pPr>
+            <a:r>
+              <a:rPr lang="en-US" dirty="0" smtClean="0"/>
+              <a:t>		[36,[2], “woo”, “woo”]</a:t>
+            </a:r>
+            <a:endParaRPr lang="en-US" dirty="0" smtClean="0"/>
           </a:p>
           <a:p>
             <a:endParaRPr lang="en-US" dirty="0" smtClean="0"/>
@@ -3285,8 +3299,8 @@
         </p:nvSpPr>
         <p:spPr>
           <a:xfrm>
-            <a:off x="3840556" y="1363167"/>
-            <a:ext cx="4828372" cy="4762995"/>
+            <a:off x="3840556" y="1363168"/>
+            <a:ext cx="4828372" cy="3909094"/>
           </a:xfrm>
           <a:prstGeom prst="rect">
             <a:avLst/>
@@ -3325,8 +3339,8 @@
         </p:nvSpPr>
         <p:spPr>
           <a:xfrm>
-            <a:off x="4863012" y="1987447"/>
-            <a:ext cx="1472618" cy="466175"/>
+            <a:off x="4863013" y="1987447"/>
+            <a:ext cx="1678930" cy="466175"/>
           </a:xfrm>
           <a:prstGeom prst="rect">
             <a:avLst/>
@@ -3353,7 +3367,15 @@
             <a:pPr algn="ctr"/>
             <a:r>
               <a:rPr lang="en-US" sz="2200" b="1" dirty="0" smtClean="0"/>
-              <a:t>[    ,    ,    ]</a:t>
+              <a:t>[    ,    ,   </a:t>
+            </a:r>
+            <a:r>
+              <a:rPr lang="en-US" sz="2200" b="1" dirty="0" smtClean="0"/>
+              <a:t>,     </a:t>
+            </a:r>
+            <a:r>
+              <a:rPr lang="en-US" sz="2200" b="1" dirty="0" smtClean="0"/>
+              <a:t>]</a:t>
             </a:r>
             <a:endParaRPr lang="en-US" sz="2200" b="1" dirty="0"/>
           </a:p>
@@ -3431,8 +3453,8 @@
         </p:nvSpPr>
         <p:spPr>
           <a:xfrm>
-            <a:off x="7909247" y="5640716"/>
-            <a:ext cx="474672" cy="369332"/>
+            <a:off x="7335448" y="3659547"/>
+            <a:ext cx="432743" cy="369332"/>
           </a:xfrm>
           <a:prstGeom prst="rect">
             <a:avLst/>
@@ -3446,8 +3468,8 @@
           <a:lstStyle/>
           <a:p>
             <a:r>
-              <a:rPr lang="en-US" dirty="0" smtClean="0"/>
-              <a:t>file</a:t>
+              <a:rPr lang="en-US" dirty="0" err="1" smtClean="0"/>
+              <a:t>str</a:t>
             </a:r>
             <a:endParaRPr lang="en-US" dirty="0"/>
           </a:p>
@@ -3462,12 +3484,14 @@
           <p:nvPr/>
         </p:nvCxnSpPr>
         <p:spPr>
-          <a:xfrm rot="16200000" flipH="1">
-            <a:off x="7503071" y="5419205"/>
-            <a:ext cx="238553" cy="573799"/>
-          </a:xfrm>
-          <a:prstGeom prst="bentConnector2">
-            <a:avLst/>
+          <a:xfrm>
+            <a:off x="6761649" y="3605659"/>
+            <a:ext cx="573799" cy="238554"/>
+          </a:xfrm>
+          <a:prstGeom prst="bentConnector3">
+            <a:avLst>
+              <a:gd name="adj1" fmla="val 50000"/>
+            </a:avLst>
           </a:prstGeom>
         </p:spPr>
         <p:style>
@@ -3609,36 +3633,6 @@
           </a:fontRef>
         </p:style>
       </p:cxnSp>
-      <p:pic>
-        <p:nvPicPr>
-          <p:cNvPr id="29" name="Picture 28" descr="377858_10151061754608807_385487081_n.jpg"/>
-          <p:cNvPicPr>
-            <a:picLocks noChangeAspect="1"/>
-          </p:cNvPicPr>
-          <p:nvPr/>
-        </p:nvPicPr>
-        <p:blipFill>
-          <a:blip r:embed="rId2">
-            <a:extLst>
-              <a:ext uri="{28A0092B-C50C-407E-A947-70E740481C1C}">
-                <a14:useLocalDpi xmlns:a14="http://schemas.microsoft.com/office/drawing/2010/main" val="0"/>
-              </a:ext>
-            </a:extLst>
-          </a:blip>
-          <a:stretch>
-            <a:fillRect/>
-          </a:stretch>
-        </p:blipFill>
-        <p:spPr>
-          <a:xfrm>
-            <a:off x="6335630" y="3129987"/>
-            <a:ext cx="2162203" cy="2471089"/>
-          </a:xfrm>
-          <a:prstGeom prst="rect">
-            <a:avLst/>
-          </a:prstGeom>
-        </p:spPr>
-      </p:pic>
       <p:sp>
         <p:nvSpPr>
           <p:cNvPr id="33" name="Rectangle 32"/>
@@ -3790,12 +3784,12 @@
         </p:nvCxnSpPr>
         <p:spPr>
           <a:xfrm rot="16200000" flipH="1">
-            <a:off x="5762914" y="2406068"/>
-            <a:ext cx="903283" cy="544551"/>
+            <a:off x="5397506" y="2677501"/>
+            <a:ext cx="1159263" cy="288936"/>
           </a:xfrm>
           <a:prstGeom prst="bentConnector3">
             <a:avLst>
-              <a:gd name="adj1" fmla="val 68411"/>
+              <a:gd name="adj1" fmla="val 99684"/>
             </a:avLst>
           </a:prstGeom>
           <a:ln>
@@ -4039,12 +4033,12 @@
         </p:nvCxnSpPr>
         <p:spPr>
           <a:xfrm rot="5400000">
-            <a:off x="5007192" y="2503547"/>
-            <a:ext cx="918925" cy="365225"/>
+            <a:off x="4943849" y="2566893"/>
+            <a:ext cx="918921" cy="238536"/>
           </a:xfrm>
           <a:prstGeom prst="bentConnector3">
             <a:avLst>
-              <a:gd name="adj1" fmla="val 66452"/>
+              <a:gd name="adj1" fmla="val 50000"/>
             </a:avLst>
           </a:prstGeom>
           <a:ln>
@@ -4105,6 +4099,279 @@
           </a:fontRef>
         </p:style>
       </p:cxnSp>
+      <p:sp>
+        <p:nvSpPr>
+          <p:cNvPr id="27" name="Rectangle 26"/>
+          <p:cNvSpPr/>
+          <p:nvPr/>
+        </p:nvSpPr>
+        <p:spPr>
+          <a:xfrm>
+            <a:off x="6121605" y="3135208"/>
+            <a:ext cx="1040025" cy="466175"/>
+          </a:xfrm>
+          <a:prstGeom prst="rect">
+            <a:avLst/>
+          </a:prstGeom>
+        </p:spPr>
+        <p:style>
+          <a:lnRef idx="2">
+            <a:schemeClr val="accent1"/>
+          </a:lnRef>
+          <a:fillRef idx="1">
+            <a:schemeClr val="lt1"/>
+          </a:fillRef>
+          <a:effectRef idx="0">
+            <a:schemeClr val="accent1"/>
+          </a:effectRef>
+          <a:fontRef idx="minor">
+            <a:schemeClr val="dk1"/>
+          </a:fontRef>
+        </p:style>
+        <p:txBody>
+          <a:bodyPr rtlCol="0" anchor="ctr"/>
+          <a:lstStyle/>
+          <a:p>
+            <a:pPr algn="ctr"/>
+            <a:r>
+              <a:rPr lang="en-US" sz="2200" b="1" dirty="0" smtClean="0"/>
+              <a:t>“woo”</a:t>
+            </a:r>
+            <a:endParaRPr lang="en-US" sz="2200" b="1" dirty="0"/>
+          </a:p>
+        </p:txBody>
+      </p:sp>
+      <p:cxnSp>
+        <p:nvCxnSpPr>
+          <p:cNvPr id="36" name="Elbow Connector 35"/>
+          <p:cNvCxnSpPr/>
+          <p:nvPr/>
+        </p:nvCxnSpPr>
+        <p:spPr>
+          <a:xfrm rot="16200000" flipH="1">
+            <a:off x="5771866" y="2633069"/>
+            <a:ext cx="892872" cy="111410"/>
+          </a:xfrm>
+          <a:prstGeom prst="bentConnector3">
+            <a:avLst>
+              <a:gd name="adj1" fmla="val 50000"/>
+            </a:avLst>
+          </a:prstGeom>
+          <a:ln>
+            <a:headEnd type="oval" w="med" len="med"/>
+            <a:tailEnd type="arrow"/>
+          </a:ln>
+        </p:spPr>
+        <p:style>
+          <a:lnRef idx="2">
+            <a:schemeClr val="accent1"/>
+          </a:lnRef>
+          <a:fillRef idx="0">
+            <a:schemeClr val="accent1"/>
+          </a:fillRef>
+          <a:effectRef idx="1">
+            <a:schemeClr val="accent1"/>
+          </a:effectRef>
+          <a:fontRef idx="minor">
+            <a:schemeClr val="tx1"/>
+          </a:fontRef>
+        </p:style>
+      </p:cxnSp>
+      <p:sp>
+        <p:nvSpPr>
+          <p:cNvPr id="39" name="Content Placeholder 2"/>
+          <p:cNvSpPr txBox="1">
+            <a:spLocks/>
+          </p:cNvSpPr>
+          <p:nvPr/>
+        </p:nvSpPr>
+        <p:spPr>
+          <a:xfrm>
+            <a:off x="3957354" y="5322499"/>
+            <a:ext cx="4711573" cy="1277872"/>
+          </a:xfrm>
+          <a:prstGeom prst="rect">
+            <a:avLst/>
+          </a:prstGeom>
+        </p:spPr>
+        <p:txBody>
+          <a:bodyPr vert="horz" lIns="91440" tIns="45720" rIns="91440" bIns="45720" rtlCol="0">
+            <a:normAutofit fontScale="55000" lnSpcReduction="20000"/>
+          </a:bodyPr>
+          <a:lstStyle>
+            <a:lvl1pPr marL="342900" indent="-342900" algn="l" defTabSz="457200" rtl="0" eaLnBrk="1" latinLnBrk="0" hangingPunct="1">
+              <a:spcBef>
+                <a:spcPct val="20000"/>
+              </a:spcBef>
+              <a:buFont typeface="Arial"/>
+              <a:buChar char="•"/>
+              <a:defRPr sz="3200" kern="1200">
+                <a:solidFill>
+                  <a:schemeClr val="tx1"/>
+                </a:solidFill>
+                <a:latin typeface="+mn-lt"/>
+                <a:ea typeface="+mn-ea"/>
+                <a:cs typeface="+mn-cs"/>
+              </a:defRPr>
+            </a:lvl1pPr>
+            <a:lvl2pPr marL="742950" indent="-285750" algn="l" defTabSz="457200" rtl="0" eaLnBrk="1" latinLnBrk="0" hangingPunct="1">
+              <a:spcBef>
+                <a:spcPct val="20000"/>
+              </a:spcBef>
+              <a:buFont typeface="Arial"/>
+              <a:buChar char="–"/>
+              <a:defRPr sz="2800" kern="1200">
+                <a:solidFill>
+                  <a:schemeClr val="tx1"/>
+                </a:solidFill>
+                <a:latin typeface="+mn-lt"/>
+                <a:ea typeface="+mn-ea"/>
+                <a:cs typeface="+mn-cs"/>
+              </a:defRPr>
+            </a:lvl2pPr>
+            <a:lvl3pPr marL="1143000" indent="-228600" algn="l" defTabSz="457200" rtl="0" eaLnBrk="1" latinLnBrk="0" hangingPunct="1">
+              <a:spcBef>
+                <a:spcPct val="20000"/>
+              </a:spcBef>
+              <a:buFont typeface="Arial"/>
+              <a:buChar char="•"/>
+              <a:defRPr sz="2400" kern="1200">
+                <a:solidFill>
+                  <a:schemeClr val="tx1"/>
+                </a:solidFill>
+                <a:latin typeface="+mn-lt"/>
+                <a:ea typeface="+mn-ea"/>
+                <a:cs typeface="+mn-cs"/>
+              </a:defRPr>
+            </a:lvl3pPr>
+            <a:lvl4pPr marL="1600200" indent="-228600" algn="l" defTabSz="457200" rtl="0" eaLnBrk="1" latinLnBrk="0" hangingPunct="1">
+              <a:spcBef>
+                <a:spcPct val="20000"/>
+              </a:spcBef>
+              <a:buFont typeface="Arial"/>
+              <a:buChar char="–"/>
+              <a:defRPr sz="2000" kern="1200">
+                <a:solidFill>
+                  <a:schemeClr val="tx1"/>
+                </a:solidFill>
+                <a:latin typeface="+mn-lt"/>
+                <a:ea typeface="+mn-ea"/>
+                <a:cs typeface="+mn-cs"/>
+              </a:defRPr>
+            </a:lvl4pPr>
+            <a:lvl5pPr marL="2057400" indent="-228600" algn="l" defTabSz="457200" rtl="0" eaLnBrk="1" latinLnBrk="0" hangingPunct="1">
+              <a:spcBef>
+                <a:spcPct val="20000"/>
+              </a:spcBef>
+              <a:buFont typeface="Arial"/>
+              <a:buChar char="»"/>
+              <a:defRPr sz="2000" kern="1200">
+                <a:solidFill>
+                  <a:schemeClr val="tx1"/>
+                </a:solidFill>
+                <a:latin typeface="+mn-lt"/>
+                <a:ea typeface="+mn-ea"/>
+                <a:cs typeface="+mn-cs"/>
+              </a:defRPr>
+            </a:lvl5pPr>
+            <a:lvl6pPr marL="2514600" indent="-228600" algn="l" defTabSz="457200" rtl="0" eaLnBrk="1" latinLnBrk="0" hangingPunct="1">
+              <a:spcBef>
+                <a:spcPct val="20000"/>
+              </a:spcBef>
+              <a:buFont typeface="Arial"/>
+              <a:buChar char="•"/>
+              <a:defRPr sz="2000" kern="1200">
+                <a:solidFill>
+                  <a:schemeClr val="tx1"/>
+                </a:solidFill>
+                <a:latin typeface="+mn-lt"/>
+                <a:ea typeface="+mn-ea"/>
+                <a:cs typeface="+mn-cs"/>
+              </a:defRPr>
+            </a:lvl6pPr>
+            <a:lvl7pPr marL="2971800" indent="-228600" algn="l" defTabSz="457200" rtl="0" eaLnBrk="1" latinLnBrk="0" hangingPunct="1">
+              <a:spcBef>
+                <a:spcPct val="20000"/>
+              </a:spcBef>
+              <a:buFont typeface="Arial"/>
+              <a:buChar char="•"/>
+              <a:defRPr sz="2000" kern="1200">
+                <a:solidFill>
+                  <a:schemeClr val="tx1"/>
+                </a:solidFill>
+                <a:latin typeface="+mn-lt"/>
+                <a:ea typeface="+mn-ea"/>
+                <a:cs typeface="+mn-cs"/>
+              </a:defRPr>
+            </a:lvl7pPr>
+            <a:lvl8pPr marL="3429000" indent="-228600" algn="l" defTabSz="457200" rtl="0" eaLnBrk="1" latinLnBrk="0" hangingPunct="1">
+              <a:spcBef>
+                <a:spcPct val="20000"/>
+              </a:spcBef>
+              <a:buFont typeface="Arial"/>
+              <a:buChar char="•"/>
+              <a:defRPr sz="2000" kern="1200">
+                <a:solidFill>
+                  <a:schemeClr val="tx1"/>
+                </a:solidFill>
+                <a:latin typeface="+mn-lt"/>
+                <a:ea typeface="+mn-ea"/>
+                <a:cs typeface="+mn-cs"/>
+              </a:defRPr>
+            </a:lvl8pPr>
+            <a:lvl9pPr marL="3886200" indent="-228600" algn="l" defTabSz="457200" rtl="0" eaLnBrk="1" latinLnBrk="0" hangingPunct="1">
+              <a:spcBef>
+                <a:spcPct val="20000"/>
+              </a:spcBef>
+              <a:buFont typeface="Arial"/>
+              <a:buChar char="•"/>
+              <a:defRPr sz="2000" kern="1200">
+                <a:solidFill>
+                  <a:schemeClr val="tx1"/>
+                </a:solidFill>
+                <a:latin typeface="+mn-lt"/>
+                <a:ea typeface="+mn-ea"/>
+                <a:cs typeface="+mn-cs"/>
+              </a:defRPr>
+            </a:lvl9pPr>
+          </a:lstStyle>
+          <a:p>
+            <a:r>
+              <a:rPr lang="en-US" dirty="0" smtClean="0"/>
+              <a:t>Why is this picture important?</a:t>
+            </a:r>
+          </a:p>
+          <a:p>
+            <a:pPr lvl="1"/>
+            <a:r>
+              <a:rPr lang="en-US" dirty="0" smtClean="0"/>
+              <a:t>We can reach the same object in </a:t>
+            </a:r>
+            <a:r>
+              <a:rPr lang="en-US" dirty="0" err="1" smtClean="0"/>
+              <a:t>mutiple</a:t>
+            </a:r>
+            <a:r>
+              <a:rPr lang="en-US" dirty="0" smtClean="0"/>
+              <a:t> ways.</a:t>
+            </a:r>
+          </a:p>
+          <a:p>
+            <a:pPr lvl="1"/>
+            <a:r>
+              <a:rPr lang="en-US" dirty="0" smtClean="0"/>
+              <a:t>For immutable objects, this isn’t a big deal.</a:t>
+            </a:r>
+          </a:p>
+          <a:p>
+            <a:pPr lvl="1"/>
+            <a:r>
+              <a:rPr lang="en-US" dirty="0" smtClean="0"/>
+              <a:t>For mutable objects, we can change an object in different ways, and it’s easy to get confused.</a:t>
+            </a:r>
+          </a:p>
+        </p:txBody>
+      </p:sp>
     </p:spTree>
     <p:extLst>
       <p:ext uri="{BB962C8B-B14F-4D97-AF65-F5344CB8AC3E}">
@@ -4172,17 +4439,23 @@
         </p:nvSpPr>
         <p:spPr>
           <a:xfrm>
-            <a:off x="457200" y="1417638"/>
-            <a:ext cx="8229600" cy="4708525"/>
-          </a:xfrm>
-        </p:spPr>
-        <p:txBody>
-          <a:bodyPr/>
+            <a:off x="457200" y="1417639"/>
+            <a:ext cx="8229600" cy="1277872"/>
+          </a:xfrm>
+        </p:spPr>
+        <p:txBody>
+          <a:bodyPr>
+            <a:normAutofit/>
+          </a:bodyPr>
           <a:lstStyle/>
           <a:p>
             <a:r>
               <a:rPr lang="en-US" dirty="0" smtClean="0"/>
-              <a:t>Mutable objects can be changed through multiple names.</a:t>
+              <a:t>Mutable </a:t>
+            </a:r>
+            <a:r>
+              <a:rPr lang="en-US" dirty="0" smtClean="0"/>
+              <a:t>objects can be changed through multiple names.</a:t>
             </a:r>
             <a:endParaRPr lang="en-US" dirty="0"/>
           </a:p>
@@ -5290,7 +5563,6 @@
               <a:rPr lang="en-US" dirty="0" smtClean="0"/>
               <a:t>.  But there’s only one list, so the change affects both variables.</a:t>
             </a:r>
-            <a:endParaRPr lang="en-US" dirty="0" smtClean="0"/>
           </a:p>
         </p:txBody>
       </p:sp>
@@ -5937,7 +6209,7 @@
         <p:spPr>
           <a:xfrm>
             <a:off x="4843728" y="5404976"/>
-            <a:ext cx="1390896" cy="466175"/>
+            <a:ext cx="1168111" cy="466175"/>
           </a:xfrm>
           <a:prstGeom prst="rect">
             <a:avLst/>
@@ -5964,8 +6236,13 @@
             <a:pPr algn="ctr"/>
             <a:r>
               <a:rPr lang="en-US" sz="2000" b="1" dirty="0" smtClean="0"/>
-              <a:t>[    ,    ]</a:t>
-            </a:r>
+              <a:t>[    </a:t>
+            </a:r>
+            <a:r>
+              <a:rPr lang="en-US" sz="2000" b="1" dirty="0"/>
+              <a:t>]</a:t>
+            </a:r>
+            <a:endParaRPr lang="en-US" sz="2000" b="1" dirty="0" smtClean="0"/>
           </a:p>
         </p:txBody>
       </p:sp>
@@ -5977,7 +6254,7 @@
         </p:nvSpPr>
         <p:spPr>
           <a:xfrm>
-            <a:off x="6447848" y="5860738"/>
+            <a:off x="6344486" y="5860738"/>
             <a:ext cx="458216" cy="369332"/>
           </a:xfrm>
           <a:prstGeom prst="rect">
@@ -6009,7 +6286,7 @@
         </p:nvCxnSpPr>
         <p:spPr>
           <a:xfrm rot="16200000" flipH="1">
-            <a:off x="6159656" y="5757211"/>
+            <a:off x="6056294" y="5757211"/>
             <a:ext cx="174253" cy="402132"/>
           </a:xfrm>
           <a:prstGeom prst="bentConnector2">
@@ -6091,75 +6368,6 @@
           <a:ln>
             <a:headEnd type="oval" w="med" len="med"/>
             <a:tailEnd type="arrow"/>
-          </a:ln>
-        </p:spPr>
-        <p:style>
-          <a:lnRef idx="2">
-            <a:schemeClr val="accent1"/>
-          </a:lnRef>
-          <a:fillRef idx="0">
-            <a:schemeClr val="accent1"/>
-          </a:fillRef>
-          <a:effectRef idx="1">
-            <a:schemeClr val="accent1"/>
-          </a:effectRef>
-          <a:fontRef idx="minor">
-            <a:schemeClr val="tx1"/>
-          </a:fontRef>
-        </p:style>
-      </p:cxnSp>
-      <p:cxnSp>
-        <p:nvCxnSpPr>
-          <p:cNvPr id="43" name="Elbow Connector 42"/>
-          <p:cNvCxnSpPr/>
-          <p:nvPr/>
-        </p:nvCxnSpPr>
-        <p:spPr>
-          <a:xfrm rot="10800000">
-            <a:off x="4843729" y="5621065"/>
-            <a:ext cx="870855" cy="407340"/>
-          </a:xfrm>
-          <a:prstGeom prst="bentConnector3">
-            <a:avLst>
-              <a:gd name="adj1" fmla="val 126250"/>
-            </a:avLst>
-          </a:prstGeom>
-          <a:ln>
-            <a:headEnd type="none" w="med" len="med"/>
-            <a:tailEnd type="arrow"/>
-          </a:ln>
-        </p:spPr>
-        <p:style>
-          <a:lnRef idx="2">
-            <a:schemeClr val="accent1"/>
-          </a:lnRef>
-          <a:fillRef idx="0">
-            <a:schemeClr val="accent1"/>
-          </a:fillRef>
-          <a:effectRef idx="1">
-            <a:schemeClr val="accent1"/>
-          </a:effectRef>
-          <a:fontRef idx="minor">
-            <a:schemeClr val="tx1"/>
-          </a:fontRef>
-        </p:style>
-      </p:cxnSp>
-      <p:cxnSp>
-        <p:nvCxnSpPr>
-          <p:cNvPr id="62" name="Straight Connector 61"/>
-          <p:cNvCxnSpPr/>
-          <p:nvPr/>
-        </p:nvCxnSpPr>
-        <p:spPr>
-          <a:xfrm>
-            <a:off x="5714583" y="5638064"/>
-            <a:ext cx="0" cy="407340"/>
-          </a:xfrm>
-          <a:prstGeom prst="line">
-            <a:avLst/>
-          </a:prstGeom>
-          <a:ln>
-            <a:headEnd type="oval"/>
           </a:ln>
         </p:spPr>
         <p:style>
@@ -6436,7 +6644,6 @@
               <a:rPr lang="en-US" dirty="0" smtClean="0"/>
               <a:t> appear changed.</a:t>
             </a:r>
-            <a:endParaRPr lang="en-US" dirty="0" smtClean="0"/>
           </a:p>
         </p:txBody>
       </p:sp>

</xml_diff>